<commit_message>
Update Precision Farming Using Autonomous Vehicle.pptx
</commit_message>
<xml_diff>
--- a/Presentation/Precision Farming Using Autonomous Vehicle.pptx
+++ b/Presentation/Precision Farming Using Autonomous Vehicle.pptx
@@ -22577,7 +22577,7 @@
       </p:grpSpPr>
       <p:sp>
         <p:nvSpPr>
-          <p:cNvPr id="36" name="Rectangle 35">
+          <p:cNvPr id="47" name="Rectangle 46">
             <a:extLst>
               <a:ext uri="{FF2B5EF4-FFF2-40B4-BE49-F238E27FC236}">
                 <a16:creationId xmlns:a16="http://schemas.microsoft.com/office/drawing/2014/main" id="{1825AC39-5F85-4CAA-8A81-A1287086B2B6}"/>
@@ -22643,7 +22643,7 @@
       </p:sp>
       <p:sp>
         <p:nvSpPr>
-          <p:cNvPr id="38" name="Freeform: Shape 37">
+          <p:cNvPr id="49" name="Freeform: Shape 48">
             <a:extLst>
               <a:ext uri="{FF2B5EF4-FFF2-40B4-BE49-F238E27FC236}">
                 <a16:creationId xmlns:a16="http://schemas.microsoft.com/office/drawing/2014/main" id="{95DA4D23-37FC-4B90-8188-F0377C5FF44B}"/>
@@ -23857,7 +23857,7 @@
       </p:sp>
       <p:sp useBgFill="1">
         <p:nvSpPr>
-          <p:cNvPr id="40" name="Freeform: Shape 39">
+          <p:cNvPr id="51" name="Freeform: Shape 50">
             <a:extLst>
               <a:ext uri="{FF2B5EF4-FFF2-40B4-BE49-F238E27FC236}">
                 <a16:creationId xmlns:a16="http://schemas.microsoft.com/office/drawing/2014/main" id="{A7A4B465-FBCC-4CD4-89A1-82992A7B47FF}"/>
@@ -25043,7 +25043,7 @@
       </p:sp>
       <p:sp>
         <p:nvSpPr>
-          <p:cNvPr id="42" name="Freeform: Shape 41">
+          <p:cNvPr id="53" name="Freeform: Shape 52">
             <a:extLst>
               <a:ext uri="{FF2B5EF4-FFF2-40B4-BE49-F238E27FC236}">
                 <a16:creationId xmlns:a16="http://schemas.microsoft.com/office/drawing/2014/main" id="{909E572F-9CDC-4214-9D42-FF0017649590}"/>
@@ -26299,7 +26299,7 @@
         <p:spPr>
           <a:xfrm>
             <a:off x="457201" y="723406"/>
-            <a:ext cx="3234018" cy="3826728"/>
+            <a:ext cx="3210447" cy="3826728"/>
           </a:xfrm>
         </p:spPr>
         <p:txBody>
@@ -26308,7 +26308,6 @@
           </a:bodyPr>
           <a:lstStyle/>
           <a:p>
-            <a:pPr algn="l"/>
             <a:r>
               <a:rPr lang="en-US" sz="4800" kern="1200" dirty="0">
                 <a:solidFill>
@@ -26344,10 +26343,10 @@
       </p:sp>
       <p:pic>
         <p:nvPicPr>
-          <p:cNvPr id="13" name="Picture Placeholder 12" descr="Diagram&#10;&#10;Description automatically generated">
+          <p:cNvPr id="5" name="Content Placeholder 4" descr="Diagram&#10;&#10;Description automatically generated">
             <a:extLst>
               <a:ext uri="{FF2B5EF4-FFF2-40B4-BE49-F238E27FC236}">
-                <a16:creationId xmlns:a16="http://schemas.microsoft.com/office/drawing/2014/main" id="{620D700D-5252-4462-3E69-5C1F604B8CC6}"/>
+                <a16:creationId xmlns:a16="http://schemas.microsoft.com/office/drawing/2014/main" id="{704AB4E1-A2F9-DEF8-EA34-37158590A158}"/>
               </a:ext>
             </a:extLst>
           </p:cNvPr>
@@ -26366,13 +26365,12 @@
         </p:blipFill>
         <p:spPr>
           <a:xfrm>
-            <a:off x="4916251" y="676994"/>
-            <a:ext cx="6631341" cy="5504012"/>
+            <a:off x="5586078" y="643469"/>
+            <a:ext cx="5291687" cy="5571062"/>
           </a:xfrm>
           <a:prstGeom prst="rect">
             <a:avLst/>
           </a:prstGeom>
-          <a:noFill/>
         </p:spPr>
       </p:pic>
       <p:sp>
@@ -34989,7 +34987,7 @@
       </p:grpSpPr>
       <p:sp>
         <p:nvSpPr>
-          <p:cNvPr id="36" name="Rectangle 35">
+          <p:cNvPr id="47" name="Rectangle 46">
             <a:extLst>
               <a:ext uri="{FF2B5EF4-FFF2-40B4-BE49-F238E27FC236}">
                 <a16:creationId xmlns:a16="http://schemas.microsoft.com/office/drawing/2014/main" id="{1825AC39-5F85-4CAA-8A81-A1287086B2B6}"/>
@@ -35055,7 +35053,7 @@
       </p:sp>
       <p:sp>
         <p:nvSpPr>
-          <p:cNvPr id="38" name="Freeform: Shape 37">
+          <p:cNvPr id="49" name="Freeform: Shape 48">
             <a:extLst>
               <a:ext uri="{FF2B5EF4-FFF2-40B4-BE49-F238E27FC236}">
                 <a16:creationId xmlns:a16="http://schemas.microsoft.com/office/drawing/2014/main" id="{95DA4D23-37FC-4B90-8188-F0377C5FF44B}"/>
@@ -36269,7 +36267,7 @@
       </p:sp>
       <p:sp useBgFill="1">
         <p:nvSpPr>
-          <p:cNvPr id="40" name="Freeform: Shape 39">
+          <p:cNvPr id="51" name="Freeform: Shape 50">
             <a:extLst>
               <a:ext uri="{FF2B5EF4-FFF2-40B4-BE49-F238E27FC236}">
                 <a16:creationId xmlns:a16="http://schemas.microsoft.com/office/drawing/2014/main" id="{A7A4B465-FBCC-4CD4-89A1-82992A7B47FF}"/>
@@ -37455,7 +37453,7 @@
       </p:sp>
       <p:sp>
         <p:nvSpPr>
-          <p:cNvPr id="42" name="Freeform: Shape 41">
+          <p:cNvPr id="53" name="Freeform: Shape 52">
             <a:extLst>
               <a:ext uri="{FF2B5EF4-FFF2-40B4-BE49-F238E27FC236}">
                 <a16:creationId xmlns:a16="http://schemas.microsoft.com/office/drawing/2014/main" id="{909E572F-9CDC-4214-9D42-FF0017649590}"/>
@@ -38710,7 +38708,7 @@
         </p:nvSpPr>
         <p:spPr>
           <a:xfrm>
-            <a:off x="519383" y="819659"/>
+            <a:off x="457201" y="723406"/>
             <a:ext cx="3234018" cy="3826728"/>
           </a:xfrm>
         </p:spPr>
@@ -38720,7 +38718,6 @@
           </a:bodyPr>
           <a:lstStyle/>
           <a:p>
-            <a:pPr algn="l"/>
             <a:r>
               <a:rPr lang="en-US" sz="4800" kern="1200" dirty="0">
                 <a:solidFill>
@@ -38730,17 +38727,17 @@
                 <a:ea typeface="+mj-ea"/>
                 <a:cs typeface="+mj-cs"/>
               </a:rPr>
-              <a:t>Upper Part of the Design</a:t>
+              <a:t>Final Design</a:t>
             </a:r>
           </a:p>
         </p:txBody>
       </p:sp>
       <p:pic>
         <p:nvPicPr>
-          <p:cNvPr id="6" name="Content Placeholder 5" descr="A picture containing diagram&#10;&#10;Description automatically generated">
+          <p:cNvPr id="9" name="Content Placeholder 8" descr="Diagram&#10;&#10;Description automatically generated with low confidence">
             <a:extLst>
               <a:ext uri="{FF2B5EF4-FFF2-40B4-BE49-F238E27FC236}">
-                <a16:creationId xmlns:a16="http://schemas.microsoft.com/office/drawing/2014/main" id="{4AB808D9-0D88-2330-F953-F5E54C651E5D}"/>
+                <a16:creationId xmlns:a16="http://schemas.microsoft.com/office/drawing/2014/main" id="{640F35F1-75CC-C38B-4968-B80F7E20A64E}"/>
               </a:ext>
             </a:extLst>
           </p:cNvPr>
@@ -38759,8 +38756,8 @@
         </p:blipFill>
         <p:spPr>
           <a:xfrm>
-            <a:off x="4916251" y="1240658"/>
-            <a:ext cx="6631341" cy="4376684"/>
+            <a:off x="4916251" y="1364995"/>
+            <a:ext cx="6818548" cy="4244545"/>
           </a:xfrm>
           <a:prstGeom prst="rect">
             <a:avLst/>

</xml_diff>